<commit_message>
Added Agenda to PP
</commit_message>
<xml_diff>
--- a/Toilet Tracker.pptx
+++ b/Toilet Tracker.pptx
@@ -111,7 +111,16 @@
       </a:defRPr>
     </a:lvl9pPr>
   </p:defaultTextStyle>
+  <p:extLst>
+    <p:ext uri="{EFAFB233-063F-42B5-8137-9DF3F51BA10A}">
+      <p15:sldGuideLst xmlns:p15="http://schemas.microsoft.com/office/powerpoint/2012/main"/>
+    </p:ext>
+  </p:extLst>
 </p:presentation>
+</file>
+
+<file path=ppt/revisionInfo.xml><?xml version="1.0" encoding="utf-8"?>
+<p1510:revInfo xmlns:a="http://schemas.openxmlformats.org/drawingml/2006/main" xmlns:r="http://schemas.openxmlformats.org/officeDocument/2006/relationships" xmlns:p1510="http://schemas.microsoft.com/office/powerpoint/2015/10/main"/>
 </file>
 
 <file path=ppt/slideLayouts/slideLayout1.xml><?xml version="1.0" encoding="utf-8"?>
@@ -338,7 +347,7 @@
           <a:p>
             <a:fld id="{87F840EC-487F-4B0E-B51B-52130782721B}" type="datetimeFigureOut">
               <a:rPr lang="de-AT" smtClean="0"/>
-              <a:t>23.10.2017</a:t>
+              <a:t>05.11.2017</a:t>
             </a:fld>
             <a:endParaRPr lang="de-AT"/>
           </a:p>
@@ -508,7 +517,7 @@
           <a:p>
             <a:fld id="{87F840EC-487F-4B0E-B51B-52130782721B}" type="datetimeFigureOut">
               <a:rPr lang="de-AT" smtClean="0"/>
-              <a:t>23.10.2017</a:t>
+              <a:t>05.11.2017</a:t>
             </a:fld>
             <a:endParaRPr lang="de-AT"/>
           </a:p>
@@ -688,7 +697,7 @@
           <a:p>
             <a:fld id="{87F840EC-487F-4B0E-B51B-52130782721B}" type="datetimeFigureOut">
               <a:rPr lang="de-AT" smtClean="0"/>
-              <a:t>23.10.2017</a:t>
+              <a:t>05.11.2017</a:t>
             </a:fld>
             <a:endParaRPr lang="de-AT"/>
           </a:p>
@@ -858,7 +867,7 @@
           <a:p>
             <a:fld id="{87F840EC-487F-4B0E-B51B-52130782721B}" type="datetimeFigureOut">
               <a:rPr lang="de-AT" smtClean="0"/>
-              <a:t>23.10.2017</a:t>
+              <a:t>05.11.2017</a:t>
             </a:fld>
             <a:endParaRPr lang="de-AT"/>
           </a:p>
@@ -1116,7 +1125,7 @@
           <a:p>
             <a:fld id="{87F840EC-487F-4B0E-B51B-52130782721B}" type="datetimeFigureOut">
               <a:rPr lang="de-AT" smtClean="0"/>
-              <a:t>23.10.2017</a:t>
+              <a:t>05.11.2017</a:t>
             </a:fld>
             <a:endParaRPr lang="de-AT"/>
           </a:p>
@@ -1404,7 +1413,7 @@
           <a:p>
             <a:fld id="{87F840EC-487F-4B0E-B51B-52130782721B}" type="datetimeFigureOut">
               <a:rPr lang="de-AT" smtClean="0"/>
-              <a:t>23.10.2017</a:t>
+              <a:t>05.11.2017</a:t>
             </a:fld>
             <a:endParaRPr lang="de-AT"/>
           </a:p>
@@ -1846,7 +1855,7 @@
           <a:p>
             <a:fld id="{87F840EC-487F-4B0E-B51B-52130782721B}" type="datetimeFigureOut">
               <a:rPr lang="de-AT" smtClean="0"/>
-              <a:t>23.10.2017</a:t>
+              <a:t>05.11.2017</a:t>
             </a:fld>
             <a:endParaRPr lang="de-AT"/>
           </a:p>
@@ -1964,7 +1973,7 @@
           <a:p>
             <a:fld id="{87F840EC-487F-4B0E-B51B-52130782721B}" type="datetimeFigureOut">
               <a:rPr lang="de-AT" smtClean="0"/>
-              <a:t>23.10.2017</a:t>
+              <a:t>05.11.2017</a:t>
             </a:fld>
             <a:endParaRPr lang="de-AT"/>
           </a:p>
@@ -2059,7 +2068,7 @@
           <a:p>
             <a:fld id="{87F840EC-487F-4B0E-B51B-52130782721B}" type="datetimeFigureOut">
               <a:rPr lang="de-AT" smtClean="0"/>
-              <a:t>23.10.2017</a:t>
+              <a:t>05.11.2017</a:t>
             </a:fld>
             <a:endParaRPr lang="de-AT"/>
           </a:p>
@@ -2347,7 +2356,7 @@
           <a:p>
             <a:fld id="{87F840EC-487F-4B0E-B51B-52130782721B}" type="datetimeFigureOut">
               <a:rPr lang="de-AT" smtClean="0"/>
-              <a:t>23.10.2017</a:t>
+              <a:t>05.11.2017</a:t>
             </a:fld>
             <a:endParaRPr lang="de-AT"/>
           </a:p>
@@ -2620,7 +2629,7 @@
           <a:p>
             <a:fld id="{87F840EC-487F-4B0E-B51B-52130782721B}" type="datetimeFigureOut">
               <a:rPr lang="de-AT" smtClean="0"/>
-              <a:t>23.10.2017</a:t>
+              <a:t>05.11.2017</a:t>
             </a:fld>
             <a:endParaRPr lang="de-AT"/>
           </a:p>
@@ -2917,7 +2926,7 @@
           <a:p>
             <a:fld id="{87F840EC-487F-4B0E-B51B-52130782721B}" type="datetimeFigureOut">
               <a:rPr lang="de-AT" smtClean="0"/>
-              <a:t>23.10.2017</a:t>
+              <a:t>05.11.2017</a:t>
             </a:fld>
             <a:endParaRPr lang="de-AT"/>
           </a:p>
@@ -3771,7 +3780,34 @@
           <a:bodyPr/>
           <a:lstStyle/>
           <a:p>
-            <a:endParaRPr lang="de-AT" dirty="0"/>
+            <a:r>
+              <a:rPr lang="de-AT" dirty="0"/>
+              <a:t>Grundgedanke</a:t>
+            </a:r>
+          </a:p>
+          <a:p>
+            <a:r>
+              <a:rPr lang="de-AT" dirty="0"/>
+              <a:t>App</a:t>
+            </a:r>
+          </a:p>
+          <a:p>
+            <a:r>
+              <a:rPr lang="de-AT" dirty="0"/>
+              <a:t>Website</a:t>
+            </a:r>
+          </a:p>
+          <a:p>
+            <a:r>
+              <a:rPr lang="de-AT" dirty="0"/>
+              <a:t>API</a:t>
+            </a:r>
+          </a:p>
+          <a:p>
+            <a:r>
+              <a:rPr lang="de-AT" dirty="0"/>
+              <a:t>Datenbank</a:t>
+            </a:r>
           </a:p>
         </p:txBody>
       </p:sp>

</xml_diff>